<commit_message>
adding more session 7 stuff
</commit_message>
<xml_diff>
--- a/sessions/session_8_modeling/RI R Learning Sessions.pptx
+++ b/sessions/session_8_modeling/RI R Learning Sessions.pptx
@@ -13,8 +13,7 @@
     <p:sldId id="261" r:id="rId7"/>
     <p:sldId id="262" r:id="rId8"/>
     <p:sldId id="263" r:id="rId9"/>
-    <p:sldId id="264" r:id="rId10"/>
-    <p:sldId id="265" r:id="rId11"/>
+    <p:sldId id="265" r:id="rId10"/>
   </p:sldIdLst>
   <p:sldSz cx="12192000" cy="6858000"/>
   <p:notesSz cx="6858000" cy="9144000"/>
@@ -4097,791 +4096,6 @@
 </p:sld>
 </file>
 
-<file path=ppt/slides/slide10.xml><?xml version="1.0" encoding="utf-8"?>
-<p:sld xmlns:a="http://schemas.openxmlformats.org/drawingml/2006/main" xmlns:r="http://schemas.openxmlformats.org/officeDocument/2006/relationships" xmlns:p="http://schemas.openxmlformats.org/presentationml/2006/main">
-  <p:cSld>
-    <p:spTree>
-      <p:nvGrpSpPr>
-        <p:cNvPr id="1" name=""/>
-        <p:cNvGrpSpPr/>
-        <p:nvPr/>
-      </p:nvGrpSpPr>
-      <p:grpSpPr>
-        <a:xfrm>
-          <a:off x="0" y="0"/>
-          <a:ext cx="0" cy="0"/>
-          <a:chOff x="0" y="0"/>
-          <a:chExt cx="0" cy="0"/>
-        </a:xfrm>
-      </p:grpSpPr>
-      <p:sp>
-        <p:nvSpPr>
-          <p:cNvPr id="2" name="Title 1">
-            <a:extLst>
-              <a:ext uri="{FF2B5EF4-FFF2-40B4-BE49-F238E27FC236}">
-                <a16:creationId xmlns:a16="http://schemas.microsoft.com/office/drawing/2014/main" id="{40588AC7-ADDC-AA98-CE99-ADD7C3A99431}"/>
-              </a:ext>
-            </a:extLst>
-          </p:cNvPr>
-          <p:cNvSpPr>
-            <a:spLocks noGrp="1"/>
-          </p:cNvSpPr>
-          <p:nvPr>
-            <p:ph type="title"/>
-          </p:nvPr>
-        </p:nvSpPr>
-        <p:spPr/>
-        <p:txBody>
-          <a:bodyPr/>
-          <a:lstStyle/>
-          <a:p>
-            <a:r>
-              <a:rPr lang="en-US" sz="4400" dirty="0"/>
-              <a:t>Session 8: Modeling</a:t>
-            </a:r>
-            <a:endParaRPr lang="en-US" dirty="0"/>
-          </a:p>
-        </p:txBody>
-      </p:sp>
-      <p:sp>
-        <p:nvSpPr>
-          <p:cNvPr id="3" name="Content Placeholder 2">
-            <a:extLst>
-              <a:ext uri="{FF2B5EF4-FFF2-40B4-BE49-F238E27FC236}">
-                <a16:creationId xmlns:a16="http://schemas.microsoft.com/office/drawing/2014/main" id="{7E90ABFE-D038-21EB-8438-E74958B7224F}"/>
-              </a:ext>
-            </a:extLst>
-          </p:cNvPr>
-          <p:cNvSpPr>
-            <a:spLocks noGrp="1"/>
-          </p:cNvSpPr>
-          <p:nvPr>
-            <p:ph idx="1"/>
-          </p:nvPr>
-        </p:nvSpPr>
-        <p:spPr>
-          <a:xfrm>
-            <a:off x="838200" y="1512795"/>
-            <a:ext cx="6181165" cy="4491318"/>
-          </a:xfrm>
-        </p:spPr>
-        <p:txBody>
-          <a:bodyPr/>
-          <a:lstStyle/>
-          <a:p>
-            <a:pPr marL="342900" marR="0" lvl="0" indent="-342900">
-              <a:lnSpc>
-                <a:spcPct val="107000"/>
-              </a:lnSpc>
-              <a:spcBef>
-                <a:spcPts val="0"/>
-              </a:spcBef>
-              <a:spcAft>
-                <a:spcPts val="0"/>
-              </a:spcAft>
-              <a:buFont typeface="Symbol" panose="05050102010706020507" pitchFamily="18" charset="2"/>
-              <a:buChar char=""/>
-            </a:pPr>
-            <a:r>
-              <a:rPr lang="en-US" sz="1100" kern="100" dirty="0">
-                <a:effectLst/>
-                <a:latin typeface="Calibri" panose="020F0502020204030204" pitchFamily="34" charset="0"/>
-                <a:ea typeface="Calibri" panose="020F0502020204030204" pitchFamily="34" charset="0"/>
-                <a:cs typeface="Times New Roman" panose="02020603050405020304" pitchFamily="18" charset="0"/>
-              </a:rPr>
-              <a:t>Go over linear regression</a:t>
-            </a:r>
-          </a:p>
-          <a:p>
-            <a:pPr marL="342900" marR="0" lvl="0" indent="-342900">
-              <a:lnSpc>
-                <a:spcPct val="107000"/>
-              </a:lnSpc>
-              <a:spcBef>
-                <a:spcPts val="0"/>
-              </a:spcBef>
-              <a:spcAft>
-                <a:spcPts val="0"/>
-              </a:spcAft>
-              <a:buFont typeface="Symbol" panose="05050102010706020507" pitchFamily="18" charset="2"/>
-              <a:buChar char=""/>
-            </a:pPr>
-            <a:r>
-              <a:rPr lang="en-US" sz="1100" kern="100" dirty="0">
-                <a:effectLst/>
-                <a:latin typeface="Calibri" panose="020F0502020204030204" pitchFamily="34" charset="0"/>
-                <a:ea typeface="Calibri" panose="020F0502020204030204" pitchFamily="34" charset="0"/>
-                <a:cs typeface="Times New Roman" panose="02020603050405020304" pitchFamily="18" charset="0"/>
-              </a:rPr>
-              <a:t>Review some lecture recordings:</a:t>
-            </a:r>
-          </a:p>
-          <a:p>
-            <a:pPr marL="742950" marR="0" lvl="1" indent="-285750">
-              <a:lnSpc>
-                <a:spcPct val="107000"/>
-              </a:lnSpc>
-              <a:spcBef>
-                <a:spcPts val="0"/>
-              </a:spcBef>
-              <a:spcAft>
-                <a:spcPts val="0"/>
-              </a:spcAft>
-              <a:buFont typeface="Courier New" panose="02070309020205020404" pitchFamily="49" charset="0"/>
-              <a:buChar char="o"/>
-            </a:pPr>
-            <a:r>
-              <a:rPr lang="en-US" sz="1100" u="sng" kern="100" dirty="0">
-                <a:solidFill>
-                  <a:srgbClr val="0563C1"/>
-                </a:solidFill>
-                <a:effectLst/>
-                <a:latin typeface="Calibri" panose="020F0502020204030204" pitchFamily="34" charset="0"/>
-                <a:ea typeface="Calibri" panose="020F0502020204030204" pitchFamily="34" charset="0"/>
-                <a:cs typeface="Times New Roman" panose="02020603050405020304" pitchFamily="18" charset="0"/>
-                <a:hlinkClick r:id="rId2"/>
-              </a:rPr>
-              <a:t>https://mediaspace.gatech.edu/playlist/details/1_g11t1e5t</a:t>
-            </a:r>
-            <a:r>
-              <a:rPr lang="en-US" sz="1100" kern="100" dirty="0">
-                <a:effectLst/>
-                <a:latin typeface="Calibri" panose="020F0502020204030204" pitchFamily="34" charset="0"/>
-                <a:ea typeface="Calibri" panose="020F0502020204030204" pitchFamily="34" charset="0"/>
-                <a:cs typeface="Times New Roman" panose="02020603050405020304" pitchFamily="18" charset="0"/>
-              </a:rPr>
-              <a:t> (linear regression)</a:t>
-            </a:r>
-          </a:p>
-          <a:p>
-            <a:pPr marL="1143000" marR="0" lvl="2" indent="-228600">
-              <a:lnSpc>
-                <a:spcPct val="107000"/>
-              </a:lnSpc>
-              <a:spcBef>
-                <a:spcPts val="0"/>
-              </a:spcBef>
-              <a:spcAft>
-                <a:spcPts val="0"/>
-              </a:spcAft>
-              <a:buFont typeface="Wingdings" panose="05000000000000000000" pitchFamily="2" charset="2"/>
-              <a:buChar char=""/>
-            </a:pPr>
-            <a:r>
-              <a:rPr lang="en-US" sz="1100" kern="100" dirty="0">
-                <a:effectLst/>
-                <a:latin typeface="Calibri" panose="020F0502020204030204" pitchFamily="34" charset="0"/>
-                <a:ea typeface="Calibri" panose="020F0502020204030204" pitchFamily="34" charset="0"/>
-                <a:cs typeface="Times New Roman" panose="02020603050405020304" pitchFamily="18" charset="0"/>
-              </a:rPr>
-              <a:t>Lecture 1 (</a:t>
-            </a:r>
-            <a:r>
-              <a:rPr lang="en-US" sz="1100" kern="100" dirty="0" err="1">
-                <a:effectLst/>
-                <a:latin typeface="Calibri" panose="020F0502020204030204" pitchFamily="34" charset="0"/>
-                <a:ea typeface="Calibri" panose="020F0502020204030204" pitchFamily="34" charset="0"/>
-                <a:cs typeface="Times New Roman" panose="02020603050405020304" pitchFamily="18" charset="0"/>
-              </a:rPr>
-              <a:t>IntroRegression</a:t>
-            </a:r>
-            <a:r>
-              <a:rPr lang="en-US" sz="1100" kern="100" dirty="0">
-                <a:effectLst/>
-                <a:latin typeface="Calibri" panose="020F0502020204030204" pitchFamily="34" charset="0"/>
-                <a:ea typeface="Calibri" panose="020F0502020204030204" pitchFamily="34" charset="0"/>
-                <a:cs typeface="Times New Roman" panose="02020603050405020304" pitchFamily="18" charset="0"/>
-              </a:rPr>
-              <a:t>): </a:t>
-            </a:r>
-            <a:r>
-              <a:rPr lang="en-US" sz="1100" u="sng" kern="100" dirty="0">
-                <a:solidFill>
-                  <a:srgbClr val="0563C1"/>
-                </a:solidFill>
-                <a:effectLst/>
-                <a:latin typeface="Calibri" panose="020F0502020204030204" pitchFamily="34" charset="0"/>
-                <a:ea typeface="Calibri" panose="020F0502020204030204" pitchFamily="34" charset="0"/>
-                <a:cs typeface="Times New Roman" panose="02020603050405020304" pitchFamily="18" charset="0"/>
-                <a:hlinkClick r:id="rId3"/>
-              </a:rPr>
-              <a:t>https://mediaspace.gatech.edu/media/OMSA_ISyE6501_M8L1_IntroRegression_refresh/1_efuxlc3o</a:t>
-            </a:r>
-            <a:endParaRPr lang="en-US" sz="1100" kern="100" dirty="0">
-              <a:effectLst/>
-              <a:latin typeface="Calibri" panose="020F0502020204030204" pitchFamily="34" charset="0"/>
-              <a:ea typeface="Calibri" panose="020F0502020204030204" pitchFamily="34" charset="0"/>
-              <a:cs typeface="Times New Roman" panose="02020603050405020304" pitchFamily="18" charset="0"/>
-            </a:endParaRPr>
-          </a:p>
-          <a:p>
-            <a:pPr marL="1143000" marR="0" lvl="2" indent="-228600">
-              <a:lnSpc>
-                <a:spcPct val="107000"/>
-              </a:lnSpc>
-              <a:spcBef>
-                <a:spcPts val="0"/>
-              </a:spcBef>
-              <a:spcAft>
-                <a:spcPts val="0"/>
-              </a:spcAft>
-              <a:buFont typeface="Wingdings" panose="05000000000000000000" pitchFamily="2" charset="2"/>
-              <a:buChar char=""/>
-            </a:pPr>
-            <a:r>
-              <a:rPr lang="en-US" sz="1100" kern="100" dirty="0">
-                <a:effectLst/>
-                <a:latin typeface="Calibri" panose="020F0502020204030204" pitchFamily="34" charset="0"/>
-                <a:ea typeface="Calibri" panose="020F0502020204030204" pitchFamily="34" charset="0"/>
-                <a:cs typeface="Times New Roman" panose="02020603050405020304" pitchFamily="18" charset="0"/>
-              </a:rPr>
-              <a:t>Lecture 2 (</a:t>
-            </a:r>
-            <a:r>
-              <a:rPr lang="en-US" sz="1100" kern="100" dirty="0" err="1">
-                <a:effectLst/>
-                <a:latin typeface="Calibri" panose="020F0502020204030204" pitchFamily="34" charset="0"/>
-                <a:ea typeface="Calibri" panose="020F0502020204030204" pitchFamily="34" charset="0"/>
-                <a:cs typeface="Times New Roman" panose="02020603050405020304" pitchFamily="18" charset="0"/>
-              </a:rPr>
-              <a:t>UsingRegression</a:t>
-            </a:r>
-            <a:r>
-              <a:rPr lang="en-US" sz="1100" kern="100" dirty="0">
-                <a:effectLst/>
-                <a:latin typeface="Calibri" panose="020F0502020204030204" pitchFamily="34" charset="0"/>
-                <a:ea typeface="Calibri" panose="020F0502020204030204" pitchFamily="34" charset="0"/>
-                <a:cs typeface="Times New Roman" panose="02020603050405020304" pitchFamily="18" charset="0"/>
-              </a:rPr>
-              <a:t>): </a:t>
-            </a:r>
-            <a:r>
-              <a:rPr lang="en-US" sz="1100" u="sng" kern="100" dirty="0">
-                <a:solidFill>
-                  <a:srgbClr val="0563C1"/>
-                </a:solidFill>
-                <a:effectLst/>
-                <a:latin typeface="Calibri" panose="020F0502020204030204" pitchFamily="34" charset="0"/>
-                <a:ea typeface="Calibri" panose="020F0502020204030204" pitchFamily="34" charset="0"/>
-                <a:cs typeface="Times New Roman" panose="02020603050405020304" pitchFamily="18" charset="0"/>
-                <a:hlinkClick r:id="rId4"/>
-              </a:rPr>
-              <a:t>https://mediaspace.gatech.edu/media/OMSA_ISyE6501_M8L3_UsingRegression_refresh_ver2/1_zapjhxsd</a:t>
-            </a:r>
-            <a:endParaRPr lang="en-US" sz="1100" kern="100" dirty="0">
-              <a:effectLst/>
-              <a:latin typeface="Calibri" panose="020F0502020204030204" pitchFamily="34" charset="0"/>
-              <a:ea typeface="Calibri" panose="020F0502020204030204" pitchFamily="34" charset="0"/>
-              <a:cs typeface="Times New Roman" panose="02020603050405020304" pitchFamily="18" charset="0"/>
-            </a:endParaRPr>
-          </a:p>
-          <a:p>
-            <a:pPr marL="742950" marR="0" lvl="1" indent="-285750">
-              <a:lnSpc>
-                <a:spcPct val="107000"/>
-              </a:lnSpc>
-              <a:spcBef>
-                <a:spcPts val="0"/>
-              </a:spcBef>
-              <a:spcAft>
-                <a:spcPts val="0"/>
-              </a:spcAft>
-              <a:buFont typeface="Courier New" panose="02070309020205020404" pitchFamily="49" charset="0"/>
-              <a:buChar char="o"/>
-            </a:pPr>
-            <a:r>
-              <a:rPr lang="en-US" sz="1100" kern="100" dirty="0">
-                <a:effectLst/>
-                <a:latin typeface="Calibri" panose="020F0502020204030204" pitchFamily="34" charset="0"/>
-                <a:ea typeface="Calibri" panose="020F0502020204030204" pitchFamily="34" charset="0"/>
-                <a:cs typeface="Times New Roman" panose="02020603050405020304" pitchFamily="18" charset="0"/>
-              </a:rPr>
-              <a:t> </a:t>
-            </a:r>
-            <a:r>
-              <a:rPr lang="en-US" sz="1100" u="sng" kern="100" dirty="0">
-                <a:solidFill>
-                  <a:srgbClr val="0563C1"/>
-                </a:solidFill>
-                <a:effectLst/>
-                <a:latin typeface="Calibri" panose="020F0502020204030204" pitchFamily="34" charset="0"/>
-                <a:ea typeface="Calibri" panose="020F0502020204030204" pitchFamily="34" charset="0"/>
-                <a:cs typeface="Times New Roman" panose="02020603050405020304" pitchFamily="18" charset="0"/>
-                <a:hlinkClick r:id="rId5"/>
-              </a:rPr>
-              <a:t>https://mediaspace.gatech.edu/playlist/details/1_5e31tm21</a:t>
-            </a:r>
-            <a:r>
-              <a:rPr lang="en-US" sz="1100" kern="100" dirty="0">
-                <a:effectLst/>
-                <a:latin typeface="Calibri" panose="020F0502020204030204" pitchFamily="34" charset="0"/>
-                <a:ea typeface="Calibri" panose="020F0502020204030204" pitchFamily="34" charset="0"/>
-                <a:cs typeface="Times New Roman" panose="02020603050405020304" pitchFamily="18" charset="0"/>
-              </a:rPr>
-              <a:t> (training)</a:t>
-            </a:r>
-          </a:p>
-          <a:p>
-            <a:pPr marL="1143000" marR="0" lvl="2" indent="-228600">
-              <a:lnSpc>
-                <a:spcPct val="107000"/>
-              </a:lnSpc>
-              <a:spcBef>
-                <a:spcPts val="0"/>
-              </a:spcBef>
-              <a:spcAft>
-                <a:spcPts val="0"/>
-              </a:spcAft>
-              <a:buFont typeface="Wingdings" panose="05000000000000000000" pitchFamily="2" charset="2"/>
-              <a:buChar char=""/>
-            </a:pPr>
-            <a:r>
-              <a:rPr lang="en-US" sz="1100" u="sng" kern="100" dirty="0">
-                <a:solidFill>
-                  <a:srgbClr val="0563C1"/>
-                </a:solidFill>
-                <a:effectLst/>
-                <a:latin typeface="Calibri" panose="020F0502020204030204" pitchFamily="34" charset="0"/>
-                <a:ea typeface="Calibri" panose="020F0502020204030204" pitchFamily="34" charset="0"/>
-                <a:cs typeface="Times New Roman" panose="02020603050405020304" pitchFamily="18" charset="0"/>
-                <a:hlinkClick r:id="rId6"/>
-              </a:rPr>
-              <a:t>https://mediaspace.gatech.edu/media/OMSA_ISyE6501_M3L1_IntrotoValidation_refresh/1_cjcexfu3</a:t>
-            </a:r>
-            <a:endParaRPr lang="en-US" sz="1100" kern="100" dirty="0">
-              <a:effectLst/>
-              <a:latin typeface="Calibri" panose="020F0502020204030204" pitchFamily="34" charset="0"/>
-              <a:ea typeface="Calibri" panose="020F0502020204030204" pitchFamily="34" charset="0"/>
-              <a:cs typeface="Times New Roman" panose="02020603050405020304" pitchFamily="18" charset="0"/>
-            </a:endParaRPr>
-          </a:p>
-          <a:p>
-            <a:pPr marL="342900" marR="0" lvl="0" indent="-342900">
-              <a:lnSpc>
-                <a:spcPct val="107000"/>
-              </a:lnSpc>
-              <a:spcBef>
-                <a:spcPts val="0"/>
-              </a:spcBef>
-              <a:spcAft>
-                <a:spcPts val="0"/>
-              </a:spcAft>
-              <a:buFont typeface="Symbol" panose="05050102010706020507" pitchFamily="18" charset="2"/>
-              <a:buChar char=""/>
-            </a:pPr>
-            <a:r>
-              <a:rPr lang="en-US" sz="1100" kern="100" dirty="0">
-                <a:effectLst/>
-                <a:latin typeface="Calibri" panose="020F0502020204030204" pitchFamily="34" charset="0"/>
-                <a:ea typeface="Calibri" panose="020F0502020204030204" pitchFamily="34" charset="0"/>
-                <a:cs typeface="Times New Roman" panose="02020603050405020304" pitchFamily="18" charset="0"/>
-              </a:rPr>
-              <a:t>Go over </a:t>
-            </a:r>
-            <a:r>
-              <a:rPr lang="en-US" sz="1100" kern="100" dirty="0" err="1">
-                <a:effectLst/>
-                <a:latin typeface="Calibri" panose="020F0502020204030204" pitchFamily="34" charset="0"/>
-                <a:ea typeface="Calibri" panose="020F0502020204030204" pitchFamily="34" charset="0"/>
-                <a:cs typeface="Times New Roman" panose="02020603050405020304" pitchFamily="18" charset="0"/>
-              </a:rPr>
-              <a:t>hw</a:t>
-            </a:r>
-            <a:r>
-              <a:rPr lang="en-US" sz="1100" kern="100" dirty="0">
-                <a:effectLst/>
-                <a:latin typeface="Calibri" panose="020F0502020204030204" pitchFamily="34" charset="0"/>
-                <a:ea typeface="Calibri" panose="020F0502020204030204" pitchFamily="34" charset="0"/>
-                <a:cs typeface="Times New Roman" panose="02020603050405020304" pitchFamily="18" charset="0"/>
-              </a:rPr>
-              <a:t> and solution</a:t>
-            </a:r>
-          </a:p>
-          <a:p>
-            <a:pPr marL="342900" marR="0" lvl="0" indent="-342900">
-              <a:lnSpc>
-                <a:spcPct val="107000"/>
-              </a:lnSpc>
-              <a:spcBef>
-                <a:spcPts val="0"/>
-              </a:spcBef>
-              <a:spcAft>
-                <a:spcPts val="0"/>
-              </a:spcAft>
-              <a:buFont typeface="Symbol" panose="05050102010706020507" pitchFamily="18" charset="2"/>
-              <a:buChar char=""/>
-            </a:pPr>
-            <a:r>
-              <a:rPr lang="en-US" sz="1100" i="1" kern="100" dirty="0">
-                <a:effectLst/>
-                <a:latin typeface="Calibri" panose="020F0502020204030204" pitchFamily="34" charset="0"/>
-                <a:ea typeface="Calibri" panose="020F0502020204030204" pitchFamily="34" charset="0"/>
-                <a:cs typeface="Times New Roman" panose="02020603050405020304" pitchFamily="18" charset="0"/>
-              </a:rPr>
-              <a:t>Ideas for the future (descriptive, predictive, and prescriptive) </a:t>
-            </a:r>
-          </a:p>
-          <a:p>
-            <a:pPr marL="742950" marR="0" lvl="1" indent="-285750">
-              <a:lnSpc>
-                <a:spcPct val="107000"/>
-              </a:lnSpc>
-              <a:spcBef>
-                <a:spcPts val="0"/>
-              </a:spcBef>
-              <a:spcAft>
-                <a:spcPts val="0"/>
-              </a:spcAft>
-              <a:buFont typeface="Courier New" panose="02070309020205020404" pitchFamily="49" charset="0"/>
-              <a:buChar char="o"/>
-            </a:pPr>
-            <a:r>
-              <a:rPr lang="en-US" sz="1100" kern="100" dirty="0">
-                <a:effectLst/>
-                <a:latin typeface="Calibri" panose="020F0502020204030204" pitchFamily="34" charset="0"/>
-                <a:ea typeface="Calibri" panose="020F0502020204030204" pitchFamily="34" charset="0"/>
-                <a:cs typeface="Times New Roman" panose="02020603050405020304" pitchFamily="18" charset="0"/>
-              </a:rPr>
-              <a:t>other models (</a:t>
-            </a:r>
-            <a:r>
-              <a:rPr lang="en-US" sz="1100" kern="100" dirty="0" err="1">
-                <a:effectLst/>
-                <a:latin typeface="Calibri" panose="020F0502020204030204" pitchFamily="34" charset="0"/>
-                <a:ea typeface="Calibri" panose="020F0502020204030204" pitchFamily="34" charset="0"/>
-                <a:cs typeface="Times New Roman" panose="02020603050405020304" pitchFamily="18" charset="0"/>
-              </a:rPr>
-              <a:t>svm</a:t>
-            </a:r>
-            <a:r>
-              <a:rPr lang="en-US" sz="1100" kern="100" dirty="0">
-                <a:effectLst/>
-                <a:latin typeface="Calibri" panose="020F0502020204030204" pitchFamily="34" charset="0"/>
-                <a:ea typeface="Calibri" panose="020F0502020204030204" pitchFamily="34" charset="0"/>
-                <a:cs typeface="Times New Roman" panose="02020603050405020304" pitchFamily="18" charset="0"/>
-              </a:rPr>
-              <a:t>, </a:t>
-            </a:r>
-            <a:r>
-              <a:rPr lang="en-US" sz="1100" kern="100" dirty="0" err="1">
-                <a:effectLst/>
-                <a:latin typeface="Calibri" panose="020F0502020204030204" pitchFamily="34" charset="0"/>
-                <a:ea typeface="Calibri" panose="020F0502020204030204" pitchFamily="34" charset="0"/>
-                <a:cs typeface="Times New Roman" panose="02020603050405020304" pitchFamily="18" charset="0"/>
-              </a:rPr>
-              <a:t>knn</a:t>
-            </a:r>
-            <a:r>
-              <a:rPr lang="en-US" sz="1100" kern="100" dirty="0">
-                <a:effectLst/>
-                <a:latin typeface="Calibri" panose="020F0502020204030204" pitchFamily="34" charset="0"/>
-                <a:ea typeface="Calibri" panose="020F0502020204030204" pitchFamily="34" charset="0"/>
-                <a:cs typeface="Times New Roman" panose="02020603050405020304" pitchFamily="18" charset="0"/>
-              </a:rPr>
-              <a:t>, </a:t>
-            </a:r>
-            <a:r>
-              <a:rPr lang="en-US" sz="1100" kern="100" dirty="0" err="1">
-                <a:effectLst/>
-                <a:latin typeface="Calibri" panose="020F0502020204030204" pitchFamily="34" charset="0"/>
-                <a:ea typeface="Calibri" panose="020F0502020204030204" pitchFamily="34" charset="0"/>
-                <a:cs typeface="Times New Roman" panose="02020603050405020304" pitchFamily="18" charset="0"/>
-              </a:rPr>
-              <a:t>kmeans</a:t>
-            </a:r>
-            <a:r>
-              <a:rPr lang="en-US" sz="1100" kern="100" dirty="0">
-                <a:effectLst/>
-                <a:latin typeface="Calibri" panose="020F0502020204030204" pitchFamily="34" charset="0"/>
-                <a:ea typeface="Calibri" panose="020F0502020204030204" pitchFamily="34" charset="0"/>
-                <a:cs typeface="Times New Roman" panose="02020603050405020304" pitchFamily="18" charset="0"/>
-              </a:rPr>
-              <a:t>, random forest (</a:t>
-            </a:r>
-            <a:r>
-              <a:rPr lang="en-US" sz="1100" kern="100" dirty="0" err="1">
-                <a:effectLst/>
-                <a:latin typeface="Calibri" panose="020F0502020204030204" pitchFamily="34" charset="0"/>
-                <a:ea typeface="Calibri" panose="020F0502020204030204" pitchFamily="34" charset="0"/>
-                <a:cs typeface="Times New Roman" panose="02020603050405020304" pitchFamily="18" charset="0"/>
-              </a:rPr>
-              <a:t>lm</a:t>
-            </a:r>
-            <a:r>
-              <a:rPr lang="en-US" sz="1100" kern="100" dirty="0">
-                <a:effectLst/>
-                <a:latin typeface="Calibri" panose="020F0502020204030204" pitchFamily="34" charset="0"/>
-                <a:ea typeface="Calibri" panose="020F0502020204030204" pitchFamily="34" charset="0"/>
-                <a:cs typeface="Times New Roman" panose="02020603050405020304" pitchFamily="18" charset="0"/>
-              </a:rPr>
-              <a:t>/logit for </a:t>
-            </a:r>
-            <a:r>
-              <a:rPr lang="en-US" sz="1100" kern="100" dirty="0" err="1">
-                <a:effectLst/>
-                <a:latin typeface="Calibri" panose="020F0502020204030204" pitchFamily="34" charset="0"/>
-                <a:ea typeface="Calibri" panose="020F0502020204030204" pitchFamily="34" charset="0"/>
-                <a:cs typeface="Times New Roman" panose="02020603050405020304" pitchFamily="18" charset="0"/>
-              </a:rPr>
-              <a:t>hella</a:t>
-            </a:r>
-            <a:r>
-              <a:rPr lang="en-US" sz="1100" kern="100" dirty="0">
-                <a:effectLst/>
-                <a:latin typeface="Calibri" panose="020F0502020204030204" pitchFamily="34" charset="0"/>
-                <a:ea typeface="Calibri" panose="020F0502020204030204" pitchFamily="34" charset="0"/>
-                <a:cs typeface="Times New Roman" panose="02020603050405020304" pitchFamily="18" charset="0"/>
-              </a:rPr>
-              <a:t> scenarios; car insurance diff based on age, type of car, geography, history, credit score))</a:t>
-            </a:r>
-          </a:p>
-          <a:p>
-            <a:pPr marL="742950" marR="0" lvl="1" indent="-285750">
-              <a:lnSpc>
-                <a:spcPct val="107000"/>
-              </a:lnSpc>
-              <a:spcBef>
-                <a:spcPts val="0"/>
-              </a:spcBef>
-              <a:spcAft>
-                <a:spcPts val="800"/>
-              </a:spcAft>
-              <a:buFont typeface="Courier New" panose="02070309020205020404" pitchFamily="49" charset="0"/>
-              <a:buChar char="o"/>
-            </a:pPr>
-            <a:r>
-              <a:rPr lang="en-US" sz="1100" kern="100" dirty="0">
-                <a:effectLst/>
-                <a:latin typeface="Calibri" panose="020F0502020204030204" pitchFamily="34" charset="0"/>
-                <a:ea typeface="Calibri" panose="020F0502020204030204" pitchFamily="34" charset="0"/>
-                <a:cs typeface="Times New Roman" panose="02020603050405020304" pitchFamily="18" charset="0"/>
-              </a:rPr>
-              <a:t>Tuning; elastic net, ridge, lasso, </a:t>
-            </a:r>
-            <a:r>
-              <a:rPr lang="en-US" sz="1100" kern="100" dirty="0" err="1">
-                <a:effectLst/>
-                <a:latin typeface="Calibri" panose="020F0502020204030204" pitchFamily="34" charset="0"/>
-                <a:ea typeface="Calibri" panose="020F0502020204030204" pitchFamily="34" charset="0"/>
-                <a:cs typeface="Times New Roman" panose="02020603050405020304" pitchFamily="18" charset="0"/>
-              </a:rPr>
-              <a:t>aic</a:t>
-            </a:r>
-            <a:r>
-              <a:rPr lang="en-US" sz="1100" kern="100" dirty="0">
-                <a:effectLst/>
-                <a:latin typeface="Calibri" panose="020F0502020204030204" pitchFamily="34" charset="0"/>
-                <a:ea typeface="Calibri" panose="020F0502020204030204" pitchFamily="34" charset="0"/>
-                <a:cs typeface="Times New Roman" panose="02020603050405020304" pitchFamily="18" charset="0"/>
-              </a:rPr>
-              <a:t>, </a:t>
-            </a:r>
-            <a:r>
-              <a:rPr lang="en-US" sz="1100" kern="100" dirty="0" err="1">
-                <a:effectLst/>
-                <a:latin typeface="Calibri" panose="020F0502020204030204" pitchFamily="34" charset="0"/>
-                <a:ea typeface="Calibri" panose="020F0502020204030204" pitchFamily="34" charset="0"/>
-                <a:cs typeface="Times New Roman" panose="02020603050405020304" pitchFamily="18" charset="0"/>
-              </a:rPr>
-              <a:t>pca</a:t>
-            </a:r>
-            <a:r>
-              <a:rPr lang="en-US" sz="1100" kern="100" dirty="0">
-                <a:effectLst/>
-                <a:latin typeface="Calibri" panose="020F0502020204030204" pitchFamily="34" charset="0"/>
-                <a:ea typeface="Calibri" panose="020F0502020204030204" pitchFamily="34" charset="0"/>
-                <a:cs typeface="Times New Roman" panose="02020603050405020304" pitchFamily="18" charset="0"/>
-              </a:rPr>
-              <a:t>, etc.</a:t>
-            </a:r>
-          </a:p>
-          <a:p>
-            <a:endParaRPr lang="en-US" dirty="0"/>
-          </a:p>
-        </p:txBody>
-      </p:sp>
-      <p:pic>
-        <p:nvPicPr>
-          <p:cNvPr id="4" name="Picture 14" descr="50+ data science memes to fight the ...">
-            <a:extLst>
-              <a:ext uri="{FF2B5EF4-FFF2-40B4-BE49-F238E27FC236}">
-                <a16:creationId xmlns:a16="http://schemas.microsoft.com/office/drawing/2014/main" id="{1480EEC2-7C16-71AE-E756-A5D605715869}"/>
-              </a:ext>
-            </a:extLst>
-          </p:cNvPr>
-          <p:cNvPicPr>
-            <a:picLocks noChangeAspect="1" noChangeArrowheads="1"/>
-          </p:cNvPicPr>
-          <p:nvPr/>
-        </p:nvPicPr>
-        <p:blipFill>
-          <a:blip r:embed="rId7">
-            <a:extLst>
-              <a:ext uri="{28A0092B-C50C-407E-A947-70E740481C1C}">
-                <a14:useLocalDpi xmlns:a14="http://schemas.microsoft.com/office/drawing/2010/main" val="0"/>
-              </a:ext>
-            </a:extLst>
-          </a:blip>
-          <a:srcRect/>
-          <a:stretch>
-            <a:fillRect/>
-          </a:stretch>
-        </p:blipFill>
-        <p:spPr bwMode="auto">
-          <a:xfrm>
-            <a:off x="8175738" y="136843"/>
-            <a:ext cx="3933494" cy="2946324"/>
-          </a:xfrm>
-          <a:prstGeom prst="rect">
-            <a:avLst/>
-          </a:prstGeom>
-          <a:noFill/>
-          <a:extLst>
-            <a:ext uri="{909E8E84-426E-40DD-AFC4-6F175D3DCCD1}">
-              <a14:hiddenFill xmlns:a14="http://schemas.microsoft.com/office/drawing/2010/main">
-                <a:solidFill>
-                  <a:srgbClr val="FFFFFF"/>
-                </a:solidFill>
-              </a14:hiddenFill>
-            </a:ext>
-          </a:extLst>
-        </p:spPr>
-      </p:pic>
-      <p:sp>
-        <p:nvSpPr>
-          <p:cNvPr id="5" name="AutoShape 2" descr="machine learning meme">
-            <a:extLst>
-              <a:ext uri="{FF2B5EF4-FFF2-40B4-BE49-F238E27FC236}">
-                <a16:creationId xmlns:a16="http://schemas.microsoft.com/office/drawing/2014/main" id="{19608CBC-0FD9-90D9-B88B-129B21E4326B}"/>
-              </a:ext>
-            </a:extLst>
-          </p:cNvPr>
-          <p:cNvSpPr>
-            <a:spLocks noChangeAspect="1" noChangeArrowheads="1"/>
-          </p:cNvSpPr>
-          <p:nvPr/>
-        </p:nvSpPr>
-        <p:spPr bwMode="auto">
-          <a:xfrm>
-            <a:off x="5513294" y="3292546"/>
-            <a:ext cx="2012577" cy="2426938"/>
-          </a:xfrm>
-          <a:prstGeom prst="rect">
-            <a:avLst/>
-          </a:prstGeom>
-          <a:noFill/>
-          <a:extLst>
-            <a:ext uri="{909E8E84-426E-40DD-AFC4-6F175D3DCCD1}">
-              <a14:hiddenFill xmlns:a14="http://schemas.microsoft.com/office/drawing/2010/main">
-                <a:solidFill>
-                  <a:srgbClr val="FFFFFF"/>
-                </a:solidFill>
-              </a14:hiddenFill>
-            </a:ext>
-          </a:extLst>
-        </p:spPr>
-        <p:txBody>
-          <a:bodyPr vert="horz" wrap="square" lIns="91440" tIns="45720" rIns="91440" bIns="45720" numCol="1" anchor="t" anchorCtr="0" compatLnSpc="1">
-            <a:prstTxWarp prst="textNoShape">
-              <a:avLst/>
-            </a:prstTxWarp>
-          </a:bodyPr>
-          <a:lstStyle/>
-          <a:p>
-            <a:endParaRPr lang="en-US"/>
-          </a:p>
-        </p:txBody>
-      </p:sp>
-      <p:pic>
-        <p:nvPicPr>
-          <p:cNvPr id="6" name="Picture 5">
-            <a:extLst>
-              <a:ext uri="{FF2B5EF4-FFF2-40B4-BE49-F238E27FC236}">
-                <a16:creationId xmlns:a16="http://schemas.microsoft.com/office/drawing/2014/main" id="{CCCC0A86-5620-1F83-B3D2-CEAC02E47B32}"/>
-              </a:ext>
-            </a:extLst>
-          </p:cNvPr>
-          <p:cNvPicPr>
-            <a:picLocks noChangeAspect="1"/>
-          </p:cNvPicPr>
-          <p:nvPr/>
-        </p:nvPicPr>
-        <p:blipFill>
-          <a:blip r:embed="rId8"/>
-          <a:stretch>
-            <a:fillRect/>
-          </a:stretch>
-        </p:blipFill>
-        <p:spPr>
-          <a:xfrm>
-            <a:off x="9623767" y="3083167"/>
-            <a:ext cx="2485465" cy="3246016"/>
-          </a:xfrm>
-          <a:prstGeom prst="rect">
-            <a:avLst/>
-          </a:prstGeom>
-        </p:spPr>
-      </p:pic>
-      <p:pic>
-        <p:nvPicPr>
-          <p:cNvPr id="2052" name="Picture 4" descr="meme #programminghumor #datascience ...">
-            <a:extLst>
-              <a:ext uri="{FF2B5EF4-FFF2-40B4-BE49-F238E27FC236}">
-                <a16:creationId xmlns:a16="http://schemas.microsoft.com/office/drawing/2014/main" id="{CBE91477-CBA3-3B26-F376-27FAE71391B9}"/>
-              </a:ext>
-            </a:extLst>
-          </p:cNvPr>
-          <p:cNvPicPr>
-            <a:picLocks noChangeAspect="1" noChangeArrowheads="1"/>
-          </p:cNvPicPr>
-          <p:nvPr/>
-        </p:nvPicPr>
-        <p:blipFill>
-          <a:blip r:embed="rId9">
-            <a:extLst>
-              <a:ext uri="{28A0092B-C50C-407E-A947-70E740481C1C}">
-                <a14:useLocalDpi xmlns:a14="http://schemas.microsoft.com/office/drawing/2010/main" val="0"/>
-              </a:ext>
-            </a:extLst>
-          </a:blip>
-          <a:srcRect/>
-          <a:stretch>
-            <a:fillRect/>
-          </a:stretch>
-        </p:blipFill>
-        <p:spPr bwMode="auto">
-          <a:xfrm>
-            <a:off x="6240151" y="4326013"/>
-            <a:ext cx="3383616" cy="2395144"/>
-          </a:xfrm>
-          <a:prstGeom prst="rect">
-            <a:avLst/>
-          </a:prstGeom>
-          <a:noFill/>
-          <a:extLst>
-            <a:ext uri="{909E8E84-426E-40DD-AFC4-6F175D3DCCD1}">
-              <a14:hiddenFill xmlns:a14="http://schemas.microsoft.com/office/drawing/2010/main">
-                <a:solidFill>
-                  <a:srgbClr val="FFFFFF"/>
-                </a:solidFill>
-              </a14:hiddenFill>
-            </a:ext>
-          </a:extLst>
-        </p:spPr>
-      </p:pic>
-    </p:spTree>
-    <p:extLst>
-      <p:ext uri="{BB962C8B-B14F-4D97-AF65-F5344CB8AC3E}">
-        <p14:creationId xmlns:p14="http://schemas.microsoft.com/office/powerpoint/2010/main" val="3400207068"/>
-      </p:ext>
-    </p:extLst>
-  </p:cSld>
-  <p:clrMapOvr>
-    <a:masterClrMapping/>
-  </p:clrMapOvr>
-</p:sld>
-</file>
-
 <file path=ppt/slides/slide2.xml><?xml version="1.0" encoding="utf-8"?>
 <p:sld xmlns:a="http://schemas.openxmlformats.org/drawingml/2006/main" xmlns:r="http://schemas.openxmlformats.org/officeDocument/2006/relationships" xmlns:p="http://schemas.openxmlformats.org/presentationml/2006/main">
   <p:cSld>
@@ -6446,14 +5660,6 @@
 <file path=ppt/slides/slide9.xml><?xml version="1.0" encoding="utf-8"?>
 <p:sld xmlns:a="http://schemas.openxmlformats.org/drawingml/2006/main" xmlns:r="http://schemas.openxmlformats.org/officeDocument/2006/relationships" xmlns:p="http://schemas.openxmlformats.org/presentationml/2006/main">
   <p:cSld>
-    <p:bg>
-      <p:bgPr>
-        <a:solidFill>
-          <a:schemeClr val="bg1"/>
-        </a:solidFill>
-        <a:effectLst/>
-      </p:bgPr>
-    </p:bg>
     <p:spTree>
       <p:nvGrpSpPr>
         <p:cNvPr id="1" name=""/>
@@ -6468,344 +5674,59 @@
           <a:chExt cx="0" cy="0"/>
         </a:xfrm>
       </p:grpSpPr>
-      <p:sp useBgFill="1">
-        <p:nvSpPr>
-          <p:cNvPr id="9" name="Rectangle 8">
-            <a:extLst>
-              <a:ext uri="{FF2B5EF4-FFF2-40B4-BE49-F238E27FC236}">
-                <a16:creationId xmlns:a16="http://schemas.microsoft.com/office/drawing/2014/main" id="{201CC55D-ED54-4C5C-95E6-10947BD1103B}"/>
-              </a:ext>
-              <a:ext uri="{C183D7F6-B498-43B3-948B-1728B52AA6E4}">
-                <adec:decorative xmlns:adec="http://schemas.microsoft.com/office/drawing/2017/decorative" val="1"/>
-              </a:ext>
-            </a:extLst>
-          </p:cNvPr>
-          <p:cNvSpPr>
-            <a:spLocks noGrp="1" noRot="1" noChangeAspect="1" noMove="1" noResize="1" noEditPoints="1" noAdjustHandles="1" noChangeArrowheads="1" noChangeShapeType="1" noTextEdit="1"/>
-          </p:cNvSpPr>
-          <p:nvPr>
-            <p:extLst>
-              <p:ext uri="{386F3935-93C4-4BCD-93E2-E3B085C9AB24}">
-                <p16:designElem xmlns:p16="http://schemas.microsoft.com/office/powerpoint/2015/main" val="1"/>
-              </p:ext>
-            </p:extLst>
+      <p:sp>
+        <p:nvSpPr>
+          <p:cNvPr id="2" name="Title 1">
+            <a:extLst>
+              <a:ext uri="{FF2B5EF4-FFF2-40B4-BE49-F238E27FC236}">
+                <a16:creationId xmlns:a16="http://schemas.microsoft.com/office/drawing/2014/main" id="{40588AC7-ADDC-AA98-CE99-ADD7C3A99431}"/>
+              </a:ext>
+            </a:extLst>
+          </p:cNvPr>
+          <p:cNvSpPr>
+            <a:spLocks noGrp="1"/>
+          </p:cNvSpPr>
+          <p:nvPr>
+            <p:ph type="title"/>
+          </p:nvPr>
+        </p:nvSpPr>
+        <p:spPr/>
+        <p:txBody>
+          <a:bodyPr/>
+          <a:lstStyle/>
+          <a:p>
+            <a:r>
+              <a:rPr lang="en-US" sz="4400" dirty="0"/>
+              <a:t>Session 8: Modeling</a:t>
+            </a:r>
+            <a:endParaRPr lang="en-US" dirty="0"/>
+          </a:p>
+        </p:txBody>
+      </p:sp>
+      <p:sp>
+        <p:nvSpPr>
+          <p:cNvPr id="3" name="Content Placeholder 2">
+            <a:extLst>
+              <a:ext uri="{FF2B5EF4-FFF2-40B4-BE49-F238E27FC236}">
+                <a16:creationId xmlns:a16="http://schemas.microsoft.com/office/drawing/2014/main" id="{7E90ABFE-D038-21EB-8438-E74958B7224F}"/>
+              </a:ext>
+            </a:extLst>
+          </p:cNvPr>
+          <p:cNvSpPr>
+            <a:spLocks noGrp="1"/>
+          </p:cNvSpPr>
+          <p:nvPr>
+            <p:ph idx="1"/>
           </p:nvPr>
         </p:nvSpPr>
         <p:spPr>
           <a:xfrm>
-            <a:off x="0" y="0"/>
-            <a:ext cx="12191999" cy="6857365"/>
-          </a:xfrm>
-          <a:prstGeom prst="rect">
-            <a:avLst/>
-          </a:prstGeom>
-          <a:ln>
-            <a:noFill/>
-          </a:ln>
-        </p:spPr>
-        <p:style>
-          <a:lnRef idx="2">
-            <a:schemeClr val="accent1">
-              <a:shade val="50000"/>
-            </a:schemeClr>
-          </a:lnRef>
-          <a:fillRef idx="1">
-            <a:schemeClr val="accent1"/>
-          </a:fillRef>
-          <a:effectRef idx="0">
-            <a:schemeClr val="accent1"/>
-          </a:effectRef>
-          <a:fontRef idx="minor">
-            <a:schemeClr val="lt1"/>
-          </a:fontRef>
-        </p:style>
-        <p:txBody>
-          <a:bodyPr rtlCol="0" anchor="ctr"/>
-          <a:lstStyle/>
-          <a:p>
-            <a:pPr algn="ctr"/>
-            <a:endParaRPr lang="en-US"/>
-          </a:p>
-        </p:txBody>
-      </p:sp>
-      <p:sp>
-        <p:nvSpPr>
-          <p:cNvPr id="2" name="Title 1">
-            <a:extLst>
-              <a:ext uri="{FF2B5EF4-FFF2-40B4-BE49-F238E27FC236}">
-                <a16:creationId xmlns:a16="http://schemas.microsoft.com/office/drawing/2014/main" id="{1447F469-DF54-723D-8608-3ACA98396FE9}"/>
-              </a:ext>
-            </a:extLst>
-          </p:cNvPr>
-          <p:cNvSpPr>
-            <a:spLocks noGrp="1"/>
-          </p:cNvSpPr>
-          <p:nvPr>
-            <p:ph type="title"/>
-          </p:nvPr>
-        </p:nvSpPr>
-        <p:spPr>
-          <a:xfrm>
-            <a:off x="589560" y="856180"/>
-            <a:ext cx="4560584" cy="1128068"/>
+            <a:off x="838200" y="1512795"/>
+            <a:ext cx="6181165" cy="4491318"/>
           </a:xfrm>
         </p:spPr>
         <p:txBody>
-          <a:bodyPr anchor="ctr">
-            <a:normAutofit/>
-          </a:bodyPr>
-          <a:lstStyle/>
-          <a:p>
-            <a:r>
-              <a:rPr lang="en-US" sz="4000" dirty="0"/>
-              <a:t>Session 8: Modeling</a:t>
-            </a:r>
-          </a:p>
-        </p:txBody>
-      </p:sp>
-      <p:grpSp>
-        <p:nvGrpSpPr>
-          <p:cNvPr id="11" name="Group 10">
-            <a:extLst>
-              <a:ext uri="{FF2B5EF4-FFF2-40B4-BE49-F238E27FC236}">
-                <a16:creationId xmlns:a16="http://schemas.microsoft.com/office/drawing/2014/main" id="{1DE889C7-FAD6-4397-98E2-05D503484459}"/>
-              </a:ext>
-              <a:ext uri="{C183D7F6-B498-43B3-948B-1728B52AA6E4}">
-                <adec:decorative xmlns:adec="http://schemas.microsoft.com/office/drawing/2017/decorative" val="1"/>
-              </a:ext>
-            </a:extLst>
-          </p:cNvPr>
-          <p:cNvGrpSpPr>
-            <a:grpSpLocks noGrp="1" noUngrp="1" noRot="1" noChangeAspect="1" noMove="1" noResize="1"/>
-          </p:cNvGrpSpPr>
-          <p:nvPr>
-            <p:extLst>
-              <p:ext uri="{386F3935-93C4-4BCD-93E2-E3B085C9AB24}">
-                <p16:designElem xmlns:p16="http://schemas.microsoft.com/office/powerpoint/2015/main" val="1"/>
-              </p:ext>
-            </p:extLst>
-          </p:nvPr>
-        </p:nvGrpSpPr>
-        <p:grpSpPr>
-          <a:xfrm>
-            <a:off x="0" y="1083484"/>
-            <a:ext cx="355196" cy="673460"/>
-            <a:chOff x="0" y="823811"/>
-            <a:chExt cx="355196" cy="673460"/>
-          </a:xfrm>
-        </p:grpSpPr>
-        <p:sp>
-          <p:nvSpPr>
-            <p:cNvPr id="12" name="Rectangle 11">
-              <a:extLst>
-                <a:ext uri="{FF2B5EF4-FFF2-40B4-BE49-F238E27FC236}">
-                  <a16:creationId xmlns:a16="http://schemas.microsoft.com/office/drawing/2014/main" id="{F399A70F-F8CD-4992-9EF5-6CF15472E73F}"/>
-                </a:ext>
-                <a:ext uri="{C183D7F6-B498-43B3-948B-1728B52AA6E4}">
-                  <adec:decorative xmlns:adec="http://schemas.microsoft.com/office/drawing/2017/decorative" val="1"/>
-                </a:ext>
-              </a:extLst>
-            </p:cNvPr>
-            <p:cNvSpPr/>
-            <p:nvPr>
-              <p:extLst>
-                <p:ext uri="{386F3935-93C4-4BCD-93E2-E3B085C9AB24}">
-                  <p16:designElem xmlns:p16="http://schemas.microsoft.com/office/powerpoint/2015/main" val="1"/>
-                </p:ext>
-              </p:extLst>
-            </p:nvPr>
-          </p:nvSpPr>
-          <p:spPr>
-            <a:xfrm>
-              <a:off x="0" y="823811"/>
-              <a:ext cx="87363" cy="673460"/>
-            </a:xfrm>
-            <a:prstGeom prst="rect">
-              <a:avLst/>
-            </a:prstGeom>
-            <a:solidFill>
-              <a:schemeClr val="accent4"/>
-            </a:solidFill>
-            <a:ln>
-              <a:noFill/>
-            </a:ln>
-          </p:spPr>
-          <p:style>
-            <a:lnRef idx="2">
-              <a:schemeClr val="accent1">
-                <a:shade val="50000"/>
-              </a:schemeClr>
-            </a:lnRef>
-            <a:fillRef idx="1">
-              <a:schemeClr val="accent1"/>
-            </a:fillRef>
-            <a:effectRef idx="0">
-              <a:schemeClr val="accent1"/>
-            </a:effectRef>
-            <a:fontRef idx="minor">
-              <a:schemeClr val="lt1"/>
-            </a:fontRef>
-          </p:style>
-          <p:txBody>
-            <a:bodyPr rtlCol="0" anchor="ctr"/>
-            <a:lstStyle/>
-            <a:p>
-              <a:pPr algn="ctr"/>
-              <a:endParaRPr lang="en-US"/>
-            </a:p>
-          </p:txBody>
-        </p:sp>
-        <p:sp>
-          <p:nvSpPr>
-            <p:cNvPr id="13" name="Rectangle 12">
-              <a:extLst>
-                <a:ext uri="{FF2B5EF4-FFF2-40B4-BE49-F238E27FC236}">
-                  <a16:creationId xmlns:a16="http://schemas.microsoft.com/office/drawing/2014/main" id="{48F4FEDC-6D80-458C-A665-075D9B9500FD}"/>
-                </a:ext>
-                <a:ext uri="{C183D7F6-B498-43B3-948B-1728B52AA6E4}">
-                  <adec:decorative xmlns:adec="http://schemas.microsoft.com/office/drawing/2017/decorative" val="1"/>
-                </a:ext>
-              </a:extLst>
-            </p:cNvPr>
-            <p:cNvSpPr/>
-            <p:nvPr>
-              <p:extLst>
-                <p:ext uri="{386F3935-93C4-4BCD-93E2-E3B085C9AB24}">
-                  <p16:designElem xmlns:p16="http://schemas.microsoft.com/office/powerpoint/2015/main" val="1"/>
-                </p:ext>
-              </p:extLst>
-            </p:nvPr>
-          </p:nvSpPr>
-          <p:spPr>
-            <a:xfrm>
-              <a:off x="159341" y="823811"/>
-              <a:ext cx="195855" cy="673460"/>
-            </a:xfrm>
-            <a:prstGeom prst="rect">
-              <a:avLst/>
-            </a:prstGeom>
-            <a:solidFill>
-              <a:schemeClr val="accent4"/>
-            </a:solidFill>
-            <a:ln>
-              <a:noFill/>
-            </a:ln>
-          </p:spPr>
-          <p:style>
-            <a:lnRef idx="2">
-              <a:schemeClr val="accent1">
-                <a:shade val="50000"/>
-              </a:schemeClr>
-            </a:lnRef>
-            <a:fillRef idx="1">
-              <a:schemeClr val="accent1"/>
-            </a:fillRef>
-            <a:effectRef idx="0">
-              <a:schemeClr val="accent1"/>
-            </a:effectRef>
-            <a:fontRef idx="minor">
-              <a:schemeClr val="lt1"/>
-            </a:fontRef>
-          </p:style>
-          <p:txBody>
-            <a:bodyPr rtlCol="0" anchor="ctr"/>
-            <a:lstStyle/>
-            <a:p>
-              <a:pPr algn="ctr"/>
-              <a:endParaRPr lang="en-US"/>
-            </a:p>
-          </p:txBody>
-        </p:sp>
-      </p:grpSp>
-      <p:sp>
-        <p:nvSpPr>
-          <p:cNvPr id="20" name="Rectangle 19">
-            <a:extLst>
-              <a:ext uri="{FF2B5EF4-FFF2-40B4-BE49-F238E27FC236}">
-                <a16:creationId xmlns:a16="http://schemas.microsoft.com/office/drawing/2014/main" id="{3873B707-463F-40B0-8227-E8CC6C67EB25}"/>
-              </a:ext>
-              <a:ext uri="{C183D7F6-B498-43B3-948B-1728B52AA6E4}">
-                <adec:decorative xmlns:adec="http://schemas.microsoft.com/office/drawing/2017/decorative" val="1"/>
-              </a:ext>
-            </a:extLst>
-          </p:cNvPr>
-          <p:cNvSpPr>
-            <a:spLocks noGrp="1" noRot="1" noChangeAspect="1" noMove="1" noResize="1" noEditPoints="1" noAdjustHandles="1" noChangeArrowheads="1" noChangeShapeType="1" noTextEdit="1"/>
-          </p:cNvSpPr>
-          <p:nvPr>
-            <p:extLst>
-              <p:ext uri="{386F3935-93C4-4BCD-93E2-E3B085C9AB24}">
-                <p16:designElem xmlns:p16="http://schemas.microsoft.com/office/powerpoint/2015/main" val="1"/>
-              </p:ext>
-            </p:extLst>
-          </p:nvPr>
-        </p:nvSpPr>
-        <p:spPr>
-          <a:xfrm flipH="1">
-            <a:off x="665085" y="2090569"/>
-            <a:ext cx="4297680" cy="27432"/>
-          </a:xfrm>
-          <a:prstGeom prst="rect">
-            <a:avLst/>
-          </a:prstGeom>
-          <a:solidFill>
-            <a:schemeClr val="accent4"/>
-          </a:solidFill>
-          <a:ln>
-            <a:noFill/>
-          </a:ln>
-        </p:spPr>
-        <p:style>
-          <a:lnRef idx="2">
-            <a:schemeClr val="accent1">
-              <a:shade val="50000"/>
-            </a:schemeClr>
-          </a:lnRef>
-          <a:fillRef idx="1">
-            <a:schemeClr val="accent1"/>
-          </a:fillRef>
-          <a:effectRef idx="0">
-            <a:schemeClr val="accent1"/>
-          </a:effectRef>
-          <a:fontRef idx="minor">
-            <a:schemeClr val="lt1"/>
-          </a:fontRef>
-        </p:style>
-        <p:txBody>
-          <a:bodyPr rtlCol="0" anchor="ctr"/>
-          <a:lstStyle/>
-          <a:p>
-            <a:pPr algn="ctr"/>
-            <a:endParaRPr lang="en-US"/>
-          </a:p>
-        </p:txBody>
-      </p:sp>
-      <p:sp>
-        <p:nvSpPr>
-          <p:cNvPr id="3" name="Content Placeholder 2">
-            <a:extLst>
-              <a:ext uri="{FF2B5EF4-FFF2-40B4-BE49-F238E27FC236}">
-                <a16:creationId xmlns:a16="http://schemas.microsoft.com/office/drawing/2014/main" id="{60D1D0C6-B29E-124A-22C9-F2349FD627F4}"/>
-              </a:ext>
-            </a:extLst>
-          </p:cNvPr>
-          <p:cNvSpPr>
-            <a:spLocks noGrp="1"/>
-          </p:cNvSpPr>
-          <p:nvPr>
-            <p:ph idx="1"/>
-          </p:nvPr>
-        </p:nvSpPr>
-        <p:spPr>
-          <a:xfrm>
-            <a:off x="590719" y="2330505"/>
-            <a:ext cx="4559425" cy="3979585"/>
-          </a:xfrm>
-        </p:spPr>
-        <p:txBody>
-          <a:bodyPr anchor="ctr">
-            <a:normAutofit/>
-          </a:bodyPr>
+          <a:bodyPr/>
           <a:lstStyle/>
           <a:p>
             <a:pPr marL="342900" marR="0" lvl="0" indent="-342900">
@@ -7335,194 +6256,74 @@
             </a:r>
           </a:p>
           <a:p>
-            <a:endParaRPr lang="en-US" sz="1100" b="1" dirty="0"/>
-          </a:p>
-        </p:txBody>
-      </p:sp>
-      <p:sp>
-        <p:nvSpPr>
-          <p:cNvPr id="21" name="Rectangle 20">
-            <a:extLst>
-              <a:ext uri="{FF2B5EF4-FFF2-40B4-BE49-F238E27FC236}">
-                <a16:creationId xmlns:a16="http://schemas.microsoft.com/office/drawing/2014/main" id="{C13237C8-E62C-4F0D-A318-BD6FB6C2D138}"/>
-              </a:ext>
-              <a:ext uri="{C183D7F6-B498-43B3-948B-1728B52AA6E4}">
-                <adec:decorative xmlns:adec="http://schemas.microsoft.com/office/drawing/2017/decorative" val="1"/>
-              </a:ext>
-            </a:extLst>
-          </p:cNvPr>
-          <p:cNvSpPr>
-            <a:spLocks noGrp="1" noRot="1" noChangeAspect="1" noMove="1" noResize="1" noEditPoints="1" noAdjustHandles="1" noChangeArrowheads="1" noChangeShapeType="1" noTextEdit="1"/>
-          </p:cNvSpPr>
-          <p:nvPr>
-            <p:extLst>
-              <p:ext uri="{386F3935-93C4-4BCD-93E2-E3B085C9AB24}">
-                <p16:designElem xmlns:p16="http://schemas.microsoft.com/office/powerpoint/2015/main" val="1"/>
-              </p:ext>
-            </p:extLst>
-          </p:nvPr>
-        </p:nvSpPr>
-        <p:spPr>
-          <a:xfrm flipH="1">
-            <a:off x="10697670" y="0"/>
-            <a:ext cx="1494330" cy="6858000"/>
-          </a:xfrm>
-          <a:prstGeom prst="rect">
-            <a:avLst/>
-          </a:prstGeom>
-          <a:solidFill>
-            <a:schemeClr val="accent4"/>
-          </a:solidFill>
-          <a:ln>
-            <a:noFill/>
-          </a:ln>
-        </p:spPr>
-        <p:style>
-          <a:lnRef idx="2">
-            <a:schemeClr val="accent1">
-              <a:shade val="50000"/>
-            </a:schemeClr>
-          </a:lnRef>
-          <a:fillRef idx="1">
-            <a:schemeClr val="accent1"/>
-          </a:fillRef>
-          <a:effectRef idx="0">
-            <a:schemeClr val="accent1"/>
-          </a:effectRef>
-          <a:fontRef idx="minor">
-            <a:schemeClr val="lt1"/>
-          </a:fontRef>
-        </p:style>
-        <p:txBody>
-          <a:bodyPr rtlCol="0" anchor="ctr"/>
-          <a:lstStyle/>
-          <a:p>
-            <a:pPr algn="ctr"/>
-            <a:endParaRPr lang="en-US"/>
-          </a:p>
-        </p:txBody>
-      </p:sp>
-      <p:sp>
-        <p:nvSpPr>
-          <p:cNvPr id="19" name="Rectangle 18">
-            <a:extLst>
-              <a:ext uri="{FF2B5EF4-FFF2-40B4-BE49-F238E27FC236}">
-                <a16:creationId xmlns:a16="http://schemas.microsoft.com/office/drawing/2014/main" id="{19C9EAEA-39D0-4B0E-A0EB-51E7B26740B1}"/>
-              </a:ext>
-              <a:ext uri="{C183D7F6-B498-43B3-948B-1728B52AA6E4}">
-                <adec:decorative xmlns:adec="http://schemas.microsoft.com/office/drawing/2017/decorative" val="1"/>
-              </a:ext>
-            </a:extLst>
-          </p:cNvPr>
-          <p:cNvSpPr>
-            <a:spLocks noGrp="1" noRot="1" noChangeAspect="1" noMove="1" noResize="1" noEditPoints="1" noAdjustHandles="1" noChangeArrowheads="1" noChangeShapeType="1" noTextEdit="1"/>
-          </p:cNvSpPr>
-          <p:nvPr>
-            <p:extLst>
-              <p:ext uri="{386F3935-93C4-4BCD-93E2-E3B085C9AB24}">
-                <p16:designElem xmlns:p16="http://schemas.microsoft.com/office/powerpoint/2015/main" val="1"/>
-              </p:ext>
-            </p:extLst>
-          </p:nvPr>
-        </p:nvSpPr>
-        <p:spPr>
-          <a:xfrm>
-            <a:off x="5685810" y="513853"/>
-            <a:ext cx="6009366" cy="5834577"/>
-          </a:xfrm>
-          <a:prstGeom prst="rect">
-            <a:avLst/>
-          </a:prstGeom>
-          <a:solidFill>
-            <a:schemeClr val="bg1"/>
-          </a:solidFill>
-          <a:ln>
-            <a:noFill/>
-          </a:ln>
-          <a:effectLst>
-            <a:outerShdw blurRad="139700" dist="127000" dir="5400000" algn="t" rotWithShape="0">
-              <a:prstClr val="black">
-                <a:alpha val="15000"/>
-              </a:prstClr>
-            </a:outerShdw>
-          </a:effectLst>
-        </p:spPr>
-        <p:style>
-          <a:lnRef idx="2">
-            <a:schemeClr val="accent1">
-              <a:shade val="50000"/>
-            </a:schemeClr>
-          </a:lnRef>
-          <a:fillRef idx="1">
-            <a:schemeClr val="accent1"/>
-          </a:fillRef>
-          <a:effectRef idx="0">
-            <a:schemeClr val="accent1"/>
-          </a:effectRef>
-          <a:fontRef idx="minor">
-            <a:schemeClr val="lt1"/>
-          </a:fontRef>
-        </p:style>
-        <p:txBody>
-          <a:bodyPr rtlCol="0" anchor="ctr"/>
-          <a:lstStyle/>
-          <a:p>
-            <a:pPr algn="ctr"/>
-            <a:endParaRPr lang="en-US"/>
-          </a:p>
-        </p:txBody>
-      </p:sp>
-      <p:sp>
-        <p:nvSpPr>
-          <p:cNvPr id="5" name="AutoShape 4" descr="50+ data science memes to fight the weekday blues | Data Science Dojo">
-            <a:extLst>
-              <a:ext uri="{FF2B5EF4-FFF2-40B4-BE49-F238E27FC236}">
-                <a16:creationId xmlns:a16="http://schemas.microsoft.com/office/drawing/2014/main" id="{3A83D811-DD2E-8F84-5426-EE799783B74A}"/>
-              </a:ext>
-            </a:extLst>
-          </p:cNvPr>
-          <p:cNvSpPr>
-            <a:spLocks noChangeAspect="1" noChangeArrowheads="1"/>
-          </p:cNvSpPr>
-          <p:nvPr/>
-        </p:nvSpPr>
-        <p:spPr bwMode="auto">
-          <a:xfrm>
-            <a:off x="5943600" y="3276600"/>
-            <a:ext cx="304800" cy="304800"/>
-          </a:xfrm>
-          <a:prstGeom prst="rect">
-            <a:avLst/>
-          </a:prstGeom>
-          <a:noFill/>
-          <a:extLst>
-            <a:ext uri="{909E8E84-426E-40DD-AFC4-6F175D3DCCD1}">
-              <a14:hiddenFill xmlns:a14="http://schemas.microsoft.com/office/drawing/2010/main">
-                <a:solidFill>
-                  <a:srgbClr val="FFFFFF"/>
-                </a:solidFill>
-              </a14:hiddenFill>
-            </a:ext>
-          </a:extLst>
-        </p:spPr>
-        <p:txBody>
-          <a:bodyPr vert="horz" wrap="square" lIns="91440" tIns="45720" rIns="91440" bIns="45720" numCol="1" anchor="t" anchorCtr="0" compatLnSpc="1">
-            <a:prstTxWarp prst="textNoShape">
-              <a:avLst/>
-            </a:prstTxWarp>
-          </a:bodyPr>
-          <a:lstStyle/>
-          <a:p>
-            <a:endParaRPr lang="en-US"/>
+            <a:pPr marL="742950" marR="0" lvl="1" indent="-285750">
+              <a:lnSpc>
+                <a:spcPct val="107000"/>
+              </a:lnSpc>
+              <a:spcBef>
+                <a:spcPts val="0"/>
+              </a:spcBef>
+              <a:spcAft>
+                <a:spcPts val="800"/>
+              </a:spcAft>
+              <a:buFont typeface="Courier New" panose="02070309020205020404" pitchFamily="49" charset="0"/>
+              <a:buChar char="o"/>
+            </a:pPr>
+            <a:r>
+              <a:rPr lang="en-US" sz="1100" kern="100" dirty="0">
+                <a:latin typeface="Calibri" panose="020F0502020204030204" pitchFamily="34" charset="0"/>
+                <a:ea typeface="Calibri" panose="020F0502020204030204" pitchFamily="34" charset="0"/>
+                <a:cs typeface="Times New Roman" panose="02020603050405020304" pitchFamily="18" charset="0"/>
+              </a:rPr>
+              <a:t>Excel regression vs R regression?</a:t>
+            </a:r>
+          </a:p>
+          <a:p>
+            <a:pPr marL="1200150" lvl="2" indent="-285750">
+              <a:lnSpc>
+                <a:spcPct val="107000"/>
+              </a:lnSpc>
+              <a:spcBef>
+                <a:spcPts val="0"/>
+              </a:spcBef>
+              <a:spcAft>
+                <a:spcPts val="800"/>
+              </a:spcAft>
+              <a:buFont typeface="Courier New" panose="02070309020205020404" pitchFamily="49" charset="0"/>
+              <a:buChar char="o"/>
+            </a:pPr>
+            <a:r>
+              <a:rPr lang="en-US" sz="700" kern="100" dirty="0">
+                <a:effectLst/>
+                <a:latin typeface="Calibri" panose="020F0502020204030204" pitchFamily="34" charset="0"/>
+                <a:ea typeface="Calibri" panose="020F0502020204030204" pitchFamily="34" charset="0"/>
+                <a:cs typeface="Times New Roman" panose="02020603050405020304" pitchFamily="18" charset="0"/>
+              </a:rPr>
+              <a:t>VERSION CONTROL </a:t>
+            </a:r>
+            <a:r>
+              <a:rPr lang="en-US" sz="700" kern="100" dirty="0">
+                <a:latin typeface="Calibri" panose="020F0502020204030204" pitchFamily="34" charset="0"/>
+                <a:ea typeface="Calibri" panose="020F0502020204030204" pitchFamily="34" charset="0"/>
+                <a:cs typeface="Times New Roman" panose="02020603050405020304" pitchFamily="18" charset="0"/>
+              </a:rPr>
+              <a:t>lol</a:t>
+            </a:r>
+            <a:endParaRPr lang="en-US" sz="700" kern="100" dirty="0">
+              <a:effectLst/>
+              <a:latin typeface="Calibri" panose="020F0502020204030204" pitchFamily="34" charset="0"/>
+              <a:ea typeface="Calibri" panose="020F0502020204030204" pitchFamily="34" charset="0"/>
+              <a:cs typeface="Times New Roman" panose="02020603050405020304" pitchFamily="18" charset="0"/>
+            </a:endParaRPr>
           </a:p>
         </p:txBody>
       </p:sp>
       <p:pic>
         <p:nvPicPr>
-          <p:cNvPr id="10" name="Picture 14" descr="50+ data science memes to fight the ...">
-            <a:extLst>
-              <a:ext uri="{FF2B5EF4-FFF2-40B4-BE49-F238E27FC236}">
-                <a16:creationId xmlns:a16="http://schemas.microsoft.com/office/drawing/2014/main" id="{2D82559E-D2EB-0D38-3134-065EB3AFC096}"/>
+          <p:cNvPr id="4" name="Picture 14" descr="50+ data science memes to fight the ...">
+            <a:extLst>
+              <a:ext uri="{FF2B5EF4-FFF2-40B4-BE49-F238E27FC236}">
+                <a16:creationId xmlns:a16="http://schemas.microsoft.com/office/drawing/2014/main" id="{1480EEC2-7C16-71AE-E756-A5D605715869}"/>
               </a:ext>
             </a:extLst>
           </p:cNvPr>
@@ -7546,8 +6347,8 @@
         </p:blipFill>
         <p:spPr bwMode="auto">
           <a:xfrm>
-            <a:off x="8499256" y="435611"/>
-            <a:ext cx="2466975" cy="1847850"/>
+            <a:off x="8175738" y="136843"/>
+            <a:ext cx="3933494" cy="2946324"/>
           </a:xfrm>
           <a:prstGeom prst="rect">
             <a:avLst/>
@@ -7564,12 +6365,87 @@
           </a:extLst>
         </p:spPr>
       </p:pic>
+      <p:sp>
+        <p:nvSpPr>
+          <p:cNvPr id="5" name="AutoShape 2" descr="machine learning meme">
+            <a:extLst>
+              <a:ext uri="{FF2B5EF4-FFF2-40B4-BE49-F238E27FC236}">
+                <a16:creationId xmlns:a16="http://schemas.microsoft.com/office/drawing/2014/main" id="{19608CBC-0FD9-90D9-B88B-129B21E4326B}"/>
+              </a:ext>
+            </a:extLst>
+          </p:cNvPr>
+          <p:cNvSpPr>
+            <a:spLocks noChangeAspect="1" noChangeArrowheads="1"/>
+          </p:cNvSpPr>
+          <p:nvPr/>
+        </p:nvSpPr>
+        <p:spPr bwMode="auto">
+          <a:xfrm>
+            <a:off x="5513294" y="3292546"/>
+            <a:ext cx="2012577" cy="2426938"/>
+          </a:xfrm>
+          <a:prstGeom prst="rect">
+            <a:avLst/>
+          </a:prstGeom>
+          <a:noFill/>
+          <a:extLst>
+            <a:ext uri="{909E8E84-426E-40DD-AFC4-6F175D3DCCD1}">
+              <a14:hiddenFill xmlns:a14="http://schemas.microsoft.com/office/drawing/2010/main">
+                <a:solidFill>
+                  <a:srgbClr val="FFFFFF"/>
+                </a:solidFill>
+              </a14:hiddenFill>
+            </a:ext>
+          </a:extLst>
+        </p:spPr>
+        <p:txBody>
+          <a:bodyPr vert="horz" wrap="square" lIns="91440" tIns="45720" rIns="91440" bIns="45720" numCol="1" anchor="t" anchorCtr="0" compatLnSpc="1">
+            <a:prstTxWarp prst="textNoShape">
+              <a:avLst/>
+            </a:prstTxWarp>
+          </a:bodyPr>
+          <a:lstStyle/>
+          <a:p>
+            <a:endParaRPr lang="en-US"/>
+          </a:p>
+        </p:txBody>
+      </p:sp>
       <p:pic>
         <p:nvPicPr>
-          <p:cNvPr id="25" name="Picture 16" descr="50+ data science memes to fight the ...">
-            <a:extLst>
-              <a:ext uri="{FF2B5EF4-FFF2-40B4-BE49-F238E27FC236}">
-                <a16:creationId xmlns:a16="http://schemas.microsoft.com/office/drawing/2014/main" id="{CC530A01-5D3F-D417-084A-EDC19C61D55B}"/>
+          <p:cNvPr id="6" name="Picture 5">
+            <a:extLst>
+              <a:ext uri="{FF2B5EF4-FFF2-40B4-BE49-F238E27FC236}">
+                <a16:creationId xmlns:a16="http://schemas.microsoft.com/office/drawing/2014/main" id="{CCCC0A86-5620-1F83-B3D2-CEAC02E47B32}"/>
+              </a:ext>
+            </a:extLst>
+          </p:cNvPr>
+          <p:cNvPicPr>
+            <a:picLocks noChangeAspect="1"/>
+          </p:cNvPicPr>
+          <p:nvPr/>
+        </p:nvPicPr>
+        <p:blipFill>
+          <a:blip r:embed="rId8"/>
+          <a:stretch>
+            <a:fillRect/>
+          </a:stretch>
+        </p:blipFill>
+        <p:spPr>
+          <a:xfrm>
+            <a:off x="9623767" y="3083167"/>
+            <a:ext cx="2485465" cy="3246016"/>
+          </a:xfrm>
+          <a:prstGeom prst="rect">
+            <a:avLst/>
+          </a:prstGeom>
+        </p:spPr>
+      </p:pic>
+      <p:pic>
+        <p:nvPicPr>
+          <p:cNvPr id="2052" name="Picture 4" descr="meme #programminghumor #datascience ...">
+            <a:extLst>
+              <a:ext uri="{FF2B5EF4-FFF2-40B4-BE49-F238E27FC236}">
+                <a16:creationId xmlns:a16="http://schemas.microsoft.com/office/drawing/2014/main" id="{CBE91477-CBA3-3B26-F376-27FAE71391B9}"/>
               </a:ext>
             </a:extLst>
           </p:cNvPr>
@@ -7579,7 +6455,7 @@
           <p:nvPr/>
         </p:nvPicPr>
         <p:blipFill>
-          <a:blip r:embed="rId7">
+          <a:blip r:embed="rId9">
             <a:extLst>
               <a:ext uri="{28A0092B-C50C-407E-A947-70E740481C1C}">
                 <a14:useLocalDpi xmlns:a14="http://schemas.microsoft.com/office/drawing/2010/main" val="0"/>
@@ -7593,8 +6469,8 @@
         </p:blipFill>
         <p:spPr bwMode="auto">
           <a:xfrm>
-            <a:off x="4133568" y="2431116"/>
-            <a:ext cx="2466975" cy="1847850"/>
+            <a:off x="6240151" y="4326013"/>
+            <a:ext cx="3383616" cy="2395144"/>
           </a:xfrm>
           <a:prstGeom prst="rect">
             <a:avLst/>
@@ -7614,7 +6490,7 @@
     </p:spTree>
     <p:extLst>
       <p:ext uri="{BB962C8B-B14F-4D97-AF65-F5344CB8AC3E}">
-        <p14:creationId xmlns:p14="http://schemas.microsoft.com/office/powerpoint/2010/main" val="3102162972"/>
+        <p14:creationId xmlns:p14="http://schemas.microsoft.com/office/powerpoint/2010/main" val="3400207068"/>
       </p:ext>
     </p:extLst>
   </p:cSld>

</xml_diff>